<commit_message>
Add and change ppt
</commit_message>
<xml_diff>
--- a/Matlab Setup.pptx
+++ b/Matlab Setup.pptx
@@ -14,7 +14,10 @@
     <p:sldId id="259" r:id="rId8"/>
     <p:sldId id="260" r:id="rId9"/>
     <p:sldId id="261" r:id="rId10"/>
-    <p:sldId id="262" r:id="rId11"/>
+    <p:sldId id="268" r:id="rId11"/>
+    <p:sldId id="262" r:id="rId12"/>
+    <p:sldId id="267" r:id="rId13"/>
+    <p:sldId id="266" r:id="rId14"/>
   </p:sldIdLst>
   <p:sldSz cx="12192000" cy="6858000"/>
   <p:notesSz cx="6858000" cy="9144000"/>
@@ -252,7 +255,7 @@
           <a:p>
             <a:fld id="{5C67E8D9-7C64-440D-89AE-E1A00C6EC129}" type="datetimeFigureOut">
               <a:rPr lang="zh-TW" altLang="en-US" smtClean="0"/>
-              <a:t>2018/8/29</a:t>
+              <a:t>2018/9/25</a:t>
             </a:fld>
             <a:endParaRPr lang="zh-TW" altLang="en-US"/>
           </a:p>
@@ -422,7 +425,7 @@
           <a:p>
             <a:fld id="{5C67E8D9-7C64-440D-89AE-E1A00C6EC129}" type="datetimeFigureOut">
               <a:rPr lang="zh-TW" altLang="en-US" smtClean="0"/>
-              <a:t>2018/8/29</a:t>
+              <a:t>2018/9/25</a:t>
             </a:fld>
             <a:endParaRPr lang="zh-TW" altLang="en-US"/>
           </a:p>
@@ -602,7 +605,7 @@
           <a:p>
             <a:fld id="{5C67E8D9-7C64-440D-89AE-E1A00C6EC129}" type="datetimeFigureOut">
               <a:rPr lang="zh-TW" altLang="en-US" smtClean="0"/>
-              <a:t>2018/8/29</a:t>
+              <a:t>2018/9/25</a:t>
             </a:fld>
             <a:endParaRPr lang="zh-TW" altLang="en-US"/>
           </a:p>
@@ -772,7 +775,7 @@
           <a:p>
             <a:fld id="{5C67E8D9-7C64-440D-89AE-E1A00C6EC129}" type="datetimeFigureOut">
               <a:rPr lang="zh-TW" altLang="en-US" smtClean="0"/>
-              <a:t>2018/8/29</a:t>
+              <a:t>2018/9/25</a:t>
             </a:fld>
             <a:endParaRPr lang="zh-TW" altLang="en-US"/>
           </a:p>
@@ -1018,7 +1021,7 @@
           <a:p>
             <a:fld id="{5C67E8D9-7C64-440D-89AE-E1A00C6EC129}" type="datetimeFigureOut">
               <a:rPr lang="zh-TW" altLang="en-US" smtClean="0"/>
-              <a:t>2018/8/29</a:t>
+              <a:t>2018/9/25</a:t>
             </a:fld>
             <a:endParaRPr lang="zh-TW" altLang="en-US"/>
           </a:p>
@@ -1250,7 +1253,7 @@
           <a:p>
             <a:fld id="{5C67E8D9-7C64-440D-89AE-E1A00C6EC129}" type="datetimeFigureOut">
               <a:rPr lang="zh-TW" altLang="en-US" smtClean="0"/>
-              <a:t>2018/8/29</a:t>
+              <a:t>2018/9/25</a:t>
             </a:fld>
             <a:endParaRPr lang="zh-TW" altLang="en-US"/>
           </a:p>
@@ -1617,7 +1620,7 @@
           <a:p>
             <a:fld id="{5C67E8D9-7C64-440D-89AE-E1A00C6EC129}" type="datetimeFigureOut">
               <a:rPr lang="zh-TW" altLang="en-US" smtClean="0"/>
-              <a:t>2018/8/29</a:t>
+              <a:t>2018/9/25</a:t>
             </a:fld>
             <a:endParaRPr lang="zh-TW" altLang="en-US"/>
           </a:p>
@@ -1735,7 +1738,7 @@
           <a:p>
             <a:fld id="{5C67E8D9-7C64-440D-89AE-E1A00C6EC129}" type="datetimeFigureOut">
               <a:rPr lang="zh-TW" altLang="en-US" smtClean="0"/>
-              <a:t>2018/8/29</a:t>
+              <a:t>2018/9/25</a:t>
             </a:fld>
             <a:endParaRPr lang="zh-TW" altLang="en-US"/>
           </a:p>
@@ -1830,7 +1833,7 @@
           <a:p>
             <a:fld id="{5C67E8D9-7C64-440D-89AE-E1A00C6EC129}" type="datetimeFigureOut">
               <a:rPr lang="zh-TW" altLang="en-US" smtClean="0"/>
-              <a:t>2018/8/29</a:t>
+              <a:t>2018/9/25</a:t>
             </a:fld>
             <a:endParaRPr lang="zh-TW" altLang="en-US"/>
           </a:p>
@@ -2107,7 +2110,7 @@
           <a:p>
             <a:fld id="{5C67E8D9-7C64-440D-89AE-E1A00C6EC129}" type="datetimeFigureOut">
               <a:rPr lang="zh-TW" altLang="en-US" smtClean="0"/>
-              <a:t>2018/8/29</a:t>
+              <a:t>2018/9/25</a:t>
             </a:fld>
             <a:endParaRPr lang="zh-TW" altLang="en-US"/>
           </a:p>
@@ -2360,7 +2363,7 @@
           <a:p>
             <a:fld id="{5C67E8D9-7C64-440D-89AE-E1A00C6EC129}" type="datetimeFigureOut">
               <a:rPr lang="zh-TW" altLang="en-US" smtClean="0"/>
-              <a:t>2018/8/29</a:t>
+              <a:t>2018/9/25</a:t>
             </a:fld>
             <a:endParaRPr lang="zh-TW" altLang="en-US"/>
           </a:p>
@@ -2573,7 +2576,7 @@
           <a:p>
             <a:fld id="{5C67E8D9-7C64-440D-89AE-E1A00C6EC129}" type="datetimeFigureOut">
               <a:rPr lang="zh-TW" altLang="en-US" smtClean="0"/>
-              <a:t>2018/8/29</a:t>
+              <a:t>2018/9/25</a:t>
             </a:fld>
             <a:endParaRPr lang="zh-TW" altLang="en-US"/>
           </a:p>
@@ -3028,20 +3031,11 @@
               <a:rPr lang="en-US" altLang="zh-TW" dirty="0" smtClean="0"/>
               <a:t>, 2018</a:t>
             </a:r>
-            <a:endParaRPr lang="en-US" altLang="zh-TW" dirty="0" smtClean="0"/>
           </a:p>
           <a:p>
             <a:r>
               <a:rPr lang="en-US" altLang="zh-TW" dirty="0" smtClean="0"/>
-              <a:t>Yu-W</a:t>
-            </a:r>
-            <a:r>
-              <a:rPr lang="en-US" altLang="zh-TW" dirty="0" smtClean="0"/>
-              <a:t>ei</a:t>
-            </a:r>
-            <a:r>
-              <a:rPr lang="en-US" altLang="zh-TW" dirty="0" smtClean="0"/>
-              <a:t> Chen</a:t>
+              <a:t>Yu-Wei Chen</a:t>
             </a:r>
           </a:p>
           <a:p>
@@ -3098,6 +3092,159 @@
       </p:grpSpPr>
       <p:sp>
         <p:nvSpPr>
+          <p:cNvPr id="2" name="Title 1"/>
+          <p:cNvSpPr>
+            <a:spLocks noGrp="1"/>
+          </p:cNvSpPr>
+          <p:nvPr>
+            <p:ph type="title"/>
+          </p:nvPr>
+        </p:nvSpPr>
+        <p:spPr/>
+        <p:txBody>
+          <a:bodyPr/>
+          <a:lstStyle/>
+          <a:p>
+            <a:r>
+              <a:rPr lang="en-US" dirty="0" err="1" smtClean="0"/>
+              <a:t>Matlab</a:t>
+            </a:r>
+            <a:r>
+              <a:rPr lang="en-US" dirty="0" smtClean="0"/>
+              <a:t> Static Class </a:t>
+            </a:r>
+            <a:r>
+              <a:rPr lang="en-US" dirty="0" err="1" smtClean="0"/>
+              <a:t>addpath</a:t>
+            </a:r>
+            <a:endParaRPr lang="en-US" dirty="0"/>
+          </a:p>
+        </p:txBody>
+      </p:sp>
+      <p:sp>
+        <p:nvSpPr>
+          <p:cNvPr id="3" name="Content Placeholder 2"/>
+          <p:cNvSpPr>
+            <a:spLocks noGrp="1"/>
+          </p:cNvSpPr>
+          <p:nvPr>
+            <p:ph idx="1"/>
+          </p:nvPr>
+        </p:nvSpPr>
+        <p:spPr/>
+        <p:txBody>
+          <a:bodyPr/>
+          <a:lstStyle/>
+          <a:p>
+            <a:r>
+              <a:rPr lang="en-US" dirty="0" smtClean="0"/>
+              <a:t>Go to </a:t>
+            </a:r>
+            <a:r>
+              <a:rPr lang="en-US" dirty="0" err="1" smtClean="0"/>
+              <a:t>Matlab</a:t>
+            </a:r>
+            <a:r>
+              <a:rPr lang="en-US" dirty="0" smtClean="0"/>
+              <a:t> install folder (C:/ or D</a:t>
+            </a:r>
+            <a:r>
+              <a:rPr lang="en-US" altLang="zh-TW" dirty="0" smtClean="0"/>
+              <a:t>:/</a:t>
+            </a:r>
+            <a:r>
+              <a:rPr lang="en-US" dirty="0" smtClean="0"/>
+              <a:t>)</a:t>
+            </a:r>
+          </a:p>
+          <a:p>
+            <a:pPr lvl="1"/>
+            <a:r>
+              <a:rPr lang="en-US" dirty="0" smtClean="0"/>
+              <a:t>Close the running </a:t>
+            </a:r>
+            <a:r>
+              <a:rPr lang="en-US" dirty="0" err="1" smtClean="0"/>
+              <a:t>Matlab</a:t>
+            </a:r>
+            <a:endParaRPr lang="en-US" dirty="0" smtClean="0"/>
+          </a:p>
+          <a:p>
+            <a:pPr lvl="1"/>
+            <a:r>
+              <a:rPr lang="en-US" dirty="0" smtClean="0"/>
+              <a:t>In &lt;</a:t>
+            </a:r>
+            <a:r>
+              <a:rPr lang="en-US" dirty="0" err="1" smtClean="0"/>
+              <a:t>Matlab</a:t>
+            </a:r>
+            <a:r>
+              <a:rPr lang="en-US" dirty="0" smtClean="0"/>
+              <a:t>&gt;/tool/local/XXXXX.txt (some </a:t>
+            </a:r>
+            <a:r>
+              <a:rPr lang="en-US" dirty="0" err="1" smtClean="0"/>
+              <a:t>config</a:t>
+            </a:r>
+            <a:r>
+              <a:rPr lang="en-US" dirty="0" smtClean="0"/>
+              <a:t> file)</a:t>
+            </a:r>
+          </a:p>
+          <a:p>
+            <a:pPr lvl="1"/>
+            <a:r>
+              <a:rPr lang="en-US" dirty="0" smtClean="0"/>
+              <a:t>Add the path to jar file with additional newline appends after</a:t>
+            </a:r>
+          </a:p>
+          <a:p>
+            <a:pPr lvl="1"/>
+            <a:r>
+              <a:rPr lang="en-US" dirty="0" smtClean="0"/>
+              <a:t>Restart </a:t>
+            </a:r>
+            <a:r>
+              <a:rPr lang="en-US" dirty="0" err="1" smtClean="0"/>
+              <a:t>Matlab</a:t>
+            </a:r>
+            <a:endParaRPr lang="en-US" dirty="0"/>
+          </a:p>
+        </p:txBody>
+      </p:sp>
+    </p:spTree>
+    <p:extLst>
+      <p:ext uri="{BB962C8B-B14F-4D97-AF65-F5344CB8AC3E}">
+        <p14:creationId xmlns:p14="http://schemas.microsoft.com/office/powerpoint/2010/main" val="1702688018"/>
+      </p:ext>
+    </p:extLst>
+  </p:cSld>
+  <p:clrMapOvr>
+    <a:masterClrMapping/>
+  </p:clrMapOvr>
+</p:sld>
+</file>
+
+<file path=ppt/slides/slide11.xml><?xml version="1.0" encoding="utf-8"?>
+<p:sld xmlns:a="http://schemas.openxmlformats.org/drawingml/2006/main" xmlns:r="http://schemas.openxmlformats.org/officeDocument/2006/relationships" xmlns:p="http://schemas.openxmlformats.org/presentationml/2006/main">
+  <p:cSld>
+    <p:spTree>
+      <p:nvGrpSpPr>
+        <p:cNvPr id="1" name=""/>
+        <p:cNvGrpSpPr/>
+        <p:nvPr/>
+      </p:nvGrpSpPr>
+      <p:grpSpPr>
+        <a:xfrm>
+          <a:off x="0" y="0"/>
+          <a:ext cx="0" cy="0"/>
+          <a:chOff x="0" y="0"/>
+          <a:chExt cx="0" cy="0"/>
+        </a:xfrm>
+      </p:grpSpPr>
+      <p:sp>
+        <p:nvSpPr>
           <p:cNvPr id="2" name="標題 1"/>
           <p:cNvSpPr>
             <a:spLocks noGrp="1"/>
@@ -3254,6 +3401,381 @@
 </p:sld>
 </file>
 
+<file path=ppt/slides/slide12.xml><?xml version="1.0" encoding="utf-8"?>
+<p:sld xmlns:a="http://schemas.openxmlformats.org/drawingml/2006/main" xmlns:r="http://schemas.openxmlformats.org/officeDocument/2006/relationships" xmlns:p="http://schemas.openxmlformats.org/presentationml/2006/main">
+  <p:cSld>
+    <p:spTree>
+      <p:nvGrpSpPr>
+        <p:cNvPr id="1" name=""/>
+        <p:cNvGrpSpPr/>
+        <p:nvPr/>
+      </p:nvGrpSpPr>
+      <p:grpSpPr>
+        <a:xfrm>
+          <a:off x="0" y="0"/>
+          <a:ext cx="0" cy="0"/>
+          <a:chOff x="0" y="0"/>
+          <a:chExt cx="0" cy="0"/>
+        </a:xfrm>
+      </p:grpSpPr>
+      <p:sp>
+        <p:nvSpPr>
+          <p:cNvPr id="2" name="Title 1"/>
+          <p:cNvSpPr>
+            <a:spLocks noGrp="1"/>
+          </p:cNvSpPr>
+          <p:nvPr>
+            <p:ph type="title"/>
+          </p:nvPr>
+        </p:nvSpPr>
+        <p:spPr/>
+        <p:txBody>
+          <a:bodyPr/>
+          <a:lstStyle/>
+          <a:p>
+            <a:r>
+              <a:rPr lang="en-US" dirty="0" smtClean="0"/>
+              <a:t>Ethernet IP configuration for DX200</a:t>
+            </a:r>
+            <a:endParaRPr lang="en-US" dirty="0"/>
+          </a:p>
+        </p:txBody>
+      </p:sp>
+      <p:sp>
+        <p:nvSpPr>
+          <p:cNvPr id="3" name="Content Placeholder 2"/>
+          <p:cNvSpPr>
+            <a:spLocks noGrp="1"/>
+          </p:cNvSpPr>
+          <p:nvPr>
+            <p:ph idx="1"/>
+          </p:nvPr>
+        </p:nvSpPr>
+        <p:spPr/>
+        <p:txBody>
+          <a:bodyPr/>
+          <a:lstStyle/>
+          <a:p>
+            <a:pPr marL="0" indent="0">
+              <a:buNone/>
+            </a:pPr>
+            <a:r>
+              <a:rPr lang="en-US" dirty="0"/>
+              <a:t>1) </a:t>
+            </a:r>
+            <a:r>
+              <a:rPr lang="en-US" dirty="0" smtClean="0"/>
+              <a:t>Turn </a:t>
+            </a:r>
+            <a:r>
+              <a:rPr lang="en-US" dirty="0"/>
+              <a:t>on controller </a:t>
+            </a:r>
+            <a:r>
+              <a:rPr lang="en-US" dirty="0" smtClean="0"/>
+              <a:t>while holding </a:t>
+            </a:r>
+            <a:r>
+              <a:rPr lang="en-US" dirty="0"/>
+              <a:t>the main </a:t>
+            </a:r>
+            <a:r>
+              <a:rPr lang="en-US" dirty="0" smtClean="0"/>
+              <a:t>menu</a:t>
+            </a:r>
+            <a:r>
+              <a:rPr lang="zh-TW" altLang="en-US" dirty="0" smtClean="0"/>
+              <a:t> </a:t>
+            </a:r>
+            <a:r>
+              <a:rPr lang="en-US" altLang="zh-TW" dirty="0" smtClean="0"/>
+              <a:t>(</a:t>
+            </a:r>
+            <a:r>
+              <a:rPr lang="zh-TW" altLang="en-US" dirty="0" smtClean="0"/>
+              <a:t>主選單</a:t>
+            </a:r>
+            <a:r>
+              <a:rPr lang="en-US" altLang="zh-TW" dirty="0" smtClean="0"/>
+              <a:t>)</a:t>
+            </a:r>
+            <a:r>
+              <a:rPr lang="en-US" dirty="0" smtClean="0"/>
+              <a:t> </a:t>
+            </a:r>
+            <a:r>
+              <a:rPr lang="en-US" dirty="0"/>
+              <a:t>key</a:t>
+            </a:r>
+          </a:p>
+          <a:p>
+            <a:pPr marL="0" indent="0">
+              <a:buNone/>
+            </a:pPr>
+            <a:r>
+              <a:rPr lang="en-US" dirty="0"/>
+              <a:t>2) </a:t>
+            </a:r>
+            <a:r>
+              <a:rPr lang="en-US" altLang="zh-TW" dirty="0" smtClean="0"/>
+              <a:t>Go to </a:t>
+            </a:r>
+            <a:r>
+              <a:rPr lang="en-US" dirty="0" smtClean="0"/>
+              <a:t>System -&gt; security </a:t>
+            </a:r>
+            <a:r>
+              <a:rPr lang="en-US" dirty="0"/>
+              <a:t>and enter 99999999 or 00000000 </a:t>
+            </a:r>
+            <a:r>
+              <a:rPr lang="en-US" dirty="0" smtClean="0"/>
+              <a:t>to </a:t>
+            </a:r>
+            <a:r>
+              <a:rPr lang="en-US" dirty="0"/>
+              <a:t>go to </a:t>
+            </a:r>
+            <a:r>
+              <a:rPr lang="en-US" b="1" dirty="0"/>
+              <a:t>Maintenance mode</a:t>
+            </a:r>
+          </a:p>
+          <a:p>
+            <a:pPr marL="0" indent="0">
+              <a:buNone/>
+            </a:pPr>
+            <a:r>
+              <a:rPr lang="en-US" dirty="0"/>
+              <a:t>3) </a:t>
+            </a:r>
+            <a:r>
+              <a:rPr lang="en-US" dirty="0" smtClean="0"/>
+              <a:t>Go to Setup -&gt; </a:t>
+            </a:r>
+            <a:r>
+              <a:rPr lang="en-US" dirty="0"/>
+              <a:t>option function </a:t>
+            </a:r>
+            <a:r>
+              <a:rPr lang="en-US" dirty="0" smtClean="0"/>
+              <a:t>-&gt; </a:t>
+            </a:r>
+            <a:r>
+              <a:rPr lang="en-US" dirty="0"/>
+              <a:t>select </a:t>
+            </a:r>
+            <a:r>
+              <a:rPr lang="en-US" dirty="0" smtClean="0"/>
+              <a:t>network</a:t>
+            </a:r>
+          </a:p>
+          <a:p>
+            <a:pPr marL="0" indent="0">
+              <a:buNone/>
+            </a:pPr>
+            <a:r>
+              <a:rPr lang="en-US" dirty="0" smtClean="0"/>
+              <a:t>4</a:t>
+            </a:r>
+            <a:r>
+              <a:rPr lang="en-US" dirty="0"/>
+              <a:t>) </a:t>
+            </a:r>
+            <a:r>
+              <a:rPr lang="en-US" dirty="0" smtClean="0"/>
+              <a:t>Setting the network</a:t>
+            </a:r>
+            <a:endParaRPr lang="en-US" dirty="0"/>
+          </a:p>
+          <a:p>
+            <a:pPr marL="0" indent="0">
+              <a:buNone/>
+            </a:pPr>
+            <a:r>
+              <a:rPr lang="en-US" dirty="0" smtClean="0"/>
+              <a:t>5) Press Enter (</a:t>
+            </a:r>
+            <a:r>
+              <a:rPr lang="zh-TW" altLang="en-US" dirty="0" smtClean="0"/>
+              <a:t>輸入</a:t>
+            </a:r>
+            <a:r>
+              <a:rPr lang="en-US" dirty="0" smtClean="0"/>
+              <a:t>), </a:t>
+            </a:r>
+            <a:r>
+              <a:rPr lang="en-US" dirty="0"/>
+              <a:t>then the controller is going to ask to modify, it might ask you few time</a:t>
+            </a:r>
+          </a:p>
+          <a:p>
+            <a:pPr marL="0" indent="0">
+              <a:buNone/>
+            </a:pPr>
+            <a:r>
+              <a:rPr lang="en-US" dirty="0"/>
+              <a:t>6) </a:t>
+            </a:r>
+            <a:r>
+              <a:rPr lang="en-US" altLang="zh-TW" dirty="0" smtClean="0"/>
+              <a:t>R</a:t>
+            </a:r>
+            <a:r>
+              <a:rPr lang="en-US" dirty="0" smtClean="0"/>
+              <a:t>eboot</a:t>
+            </a:r>
+          </a:p>
+          <a:p>
+            <a:pPr marL="0" indent="0">
+              <a:buNone/>
+            </a:pPr>
+            <a:r>
+              <a:rPr lang="en-US" dirty="0" smtClean="0"/>
+              <a:t>7) Done</a:t>
+            </a:r>
+            <a:endParaRPr lang="en-US" dirty="0"/>
+          </a:p>
+        </p:txBody>
+      </p:sp>
+    </p:spTree>
+    <p:extLst>
+      <p:ext uri="{BB962C8B-B14F-4D97-AF65-F5344CB8AC3E}">
+        <p14:creationId xmlns:p14="http://schemas.microsoft.com/office/powerpoint/2010/main" val="2546510775"/>
+      </p:ext>
+    </p:extLst>
+  </p:cSld>
+  <p:clrMapOvr>
+    <a:masterClrMapping/>
+  </p:clrMapOvr>
+</p:sld>
+</file>
+
+<file path=ppt/slides/slide13.xml><?xml version="1.0" encoding="utf-8"?>
+<p:sld xmlns:a="http://schemas.openxmlformats.org/drawingml/2006/main" xmlns:r="http://schemas.openxmlformats.org/officeDocument/2006/relationships" xmlns:p="http://schemas.openxmlformats.org/presentationml/2006/main">
+  <p:cSld>
+    <p:spTree>
+      <p:nvGrpSpPr>
+        <p:cNvPr id="1" name=""/>
+        <p:cNvGrpSpPr/>
+        <p:nvPr/>
+      </p:nvGrpSpPr>
+      <p:grpSpPr>
+        <a:xfrm>
+          <a:off x="0" y="0"/>
+          <a:ext cx="0" cy="0"/>
+          <a:chOff x="0" y="0"/>
+          <a:chExt cx="0" cy="0"/>
+        </a:xfrm>
+      </p:grpSpPr>
+      <p:sp>
+        <p:nvSpPr>
+          <p:cNvPr id="2" name="Title 1"/>
+          <p:cNvSpPr>
+            <a:spLocks noGrp="1"/>
+          </p:cNvSpPr>
+          <p:nvPr>
+            <p:ph type="title"/>
+          </p:nvPr>
+        </p:nvSpPr>
+        <p:spPr/>
+        <p:txBody>
+          <a:bodyPr/>
+          <a:lstStyle/>
+          <a:p>
+            <a:r>
+              <a:rPr lang="en-US" dirty="0" smtClean="0"/>
+              <a:t>5 point calibration</a:t>
+            </a:r>
+            <a:endParaRPr lang="en-US" dirty="0"/>
+          </a:p>
+        </p:txBody>
+      </p:sp>
+      <p:sp>
+        <p:nvSpPr>
+          <p:cNvPr id="3" name="Content Placeholder 2"/>
+          <p:cNvSpPr>
+            <a:spLocks noGrp="1"/>
+          </p:cNvSpPr>
+          <p:nvPr>
+            <p:ph idx="1"/>
+          </p:nvPr>
+        </p:nvSpPr>
+        <p:spPr/>
+        <p:txBody>
+          <a:bodyPr/>
+          <a:lstStyle/>
+          <a:p>
+            <a:r>
+              <a:rPr lang="en-US" dirty="0" smtClean="0"/>
+              <a:t>We use the 5-point (or more) calibration to set the tool offset from the center TCP.</a:t>
+            </a:r>
+          </a:p>
+          <a:p>
+            <a:r>
+              <a:rPr lang="en-US" dirty="0" smtClean="0"/>
+              <a:t>Procedure: Main </a:t>
+            </a:r>
+            <a:r>
+              <a:rPr lang="en-US" dirty="0"/>
+              <a:t>Menu </a:t>
+            </a:r>
+            <a:r>
+              <a:rPr lang="en-US" dirty="0" smtClean="0"/>
+              <a:t>-&gt; </a:t>
+            </a:r>
+            <a:r>
+              <a:rPr lang="en-US" dirty="0"/>
+              <a:t>Robot </a:t>
+            </a:r>
+            <a:r>
+              <a:rPr lang="en-US" dirty="0" smtClean="0"/>
+              <a:t>-&gt; </a:t>
+            </a:r>
+            <a:r>
+              <a:rPr lang="en-US" dirty="0"/>
+              <a:t>Tool </a:t>
+            </a:r>
+            <a:r>
+              <a:rPr lang="en-US" dirty="0" smtClean="0"/>
+              <a:t>-&gt; </a:t>
+            </a:r>
+            <a:r>
+              <a:rPr lang="en-US" dirty="0"/>
+              <a:t>Select the tool to create TCP </a:t>
+            </a:r>
+            <a:r>
+              <a:rPr lang="en-US" dirty="0" smtClean="0"/>
+              <a:t>-&gt; </a:t>
+            </a:r>
+            <a:r>
+              <a:rPr lang="en-US" dirty="0"/>
+              <a:t>Utility </a:t>
+            </a:r>
+            <a:r>
+              <a:rPr lang="en-US" dirty="0" smtClean="0"/>
+              <a:t>-&gt; </a:t>
+            </a:r>
+            <a:r>
+              <a:rPr lang="en-US" dirty="0"/>
+              <a:t>Calibration</a:t>
+            </a:r>
+          </a:p>
+        </p:txBody>
+      </p:sp>
+    </p:spTree>
+    <p:extLst>
+      <p:ext uri="{BB962C8B-B14F-4D97-AF65-F5344CB8AC3E}">
+        <p14:creationId xmlns:p14="http://schemas.microsoft.com/office/powerpoint/2010/main" val="3118865212"/>
+      </p:ext>
+    </p:extLst>
+  </p:cSld>
+  <p:clrMapOvr>
+    <a:masterClrMapping/>
+  </p:clrMapOvr>
+</p:sld>
+</file>
+
 <file path=ppt/slides/slide2.xml><?xml version="1.0" encoding="utf-8"?>
 <p:sld xmlns:a="http://schemas.openxmlformats.org/drawingml/2006/main" xmlns:r="http://schemas.openxmlformats.org/officeDocument/2006/relationships" xmlns:p="http://schemas.openxmlformats.org/presentationml/2006/main">
   <p:cSld>
@@ -3321,11 +3843,7 @@
             </a:r>
             <a:r>
               <a:rPr lang="en-US" altLang="zh-TW" dirty="0" smtClean="0"/>
-              <a:t> </a:t>
-            </a:r>
-            <a:r>
-              <a:rPr lang="en-US" altLang="zh-TW" dirty="0" smtClean="0"/>
-              <a:t>Environment setting </a:t>
+              <a:t> Environment setting </a:t>
             </a:r>
           </a:p>
           <a:p>
@@ -3335,11 +3853,7 @@
             </a:r>
             <a:r>
               <a:rPr lang="en-US" altLang="zh-TW" dirty="0" smtClean="0"/>
-              <a:t> </a:t>
-            </a:r>
-            <a:r>
-              <a:rPr lang="en-US" altLang="zh-TW" dirty="0" smtClean="0"/>
-              <a:t>API</a:t>
+              <a:t> API</a:t>
             </a:r>
             <a:r>
               <a:rPr lang="zh-TW" altLang="en-US" dirty="0" smtClean="0"/>
@@ -3349,7 +3863,6 @@
               <a:rPr lang="en-US" altLang="zh-TW" dirty="0" smtClean="0"/>
               <a:t>Explanation </a:t>
             </a:r>
-            <a:endParaRPr lang="en-US" altLang="zh-TW" dirty="0" smtClean="0"/>
           </a:p>
         </p:txBody>
       </p:sp>

</xml_diff>